<commit_message>
slides updated followig the reviews
</commit_message>
<xml_diff>
--- a/T2.1_KAI_GNN_IRTSX.pptx
+++ b/T2.1_KAI_GNN_IRTSX.pptx
@@ -758,7 +758,7 @@
           <a:p>
             <a:fld id="{BC691CB5-4CA9-43C0-979A-A28A5AF4624E}" type="datetimeFigureOut">
               <a:rPr lang="fr-FR" smtClean="0"/>
-              <a:t>04/03/2025</a:t>
+              <a:t>26/03/2025</a:t>
             </a:fld>
             <a:endParaRPr lang="fr-FR"/>
           </a:p>
@@ -2794,7 +2794,7 @@
             <a:fld id="{DCAF1DC6-EAE1-4388-AADE-D441CE8D7AF0}" type="datetimeFigureOut">
               <a:rPr lang="pt-PT" smtClean="0"/>
               <a:pPr/>
-              <a:t>04/03/2025</a:t>
+              <a:t>26/03/2025</a:t>
             </a:fld>
             <a:endParaRPr lang="pt-PT"/>
           </a:p>
@@ -3454,7 +3454,7 @@
             <a:fld id="{DCAF1DC6-EAE1-4388-AADE-D441CE8D7AF0}" type="datetimeFigureOut">
               <a:rPr lang="pt-PT" smtClean="0"/>
               <a:pPr/>
-              <a:t>04/03/2025</a:t>
+              <a:t>26/03/2025</a:t>
             </a:fld>
             <a:endParaRPr lang="pt-PT"/>
           </a:p>
@@ -8450,7 +8450,7 @@
           <a:p>
             <a:fld id="{DCAF1DC6-EAE1-4388-AADE-D441CE8D7AF0}" type="datetimeFigureOut">
               <a:rPr lang="pt-PT" smtClean="0"/>
-              <a:t>04/03/2025</a:t>
+              <a:t>26/03/2025</a:t>
             </a:fld>
             <a:endParaRPr lang="pt-PT"/>
           </a:p>
@@ -8917,7 +8917,7 @@
           <a:p>
             <a:r>
               <a:rPr lang="pt-PT" dirty="0"/>
-              <a:t>Power Grid domain</a:t>
+              <a:t>Task 2.1 – Knowledge-assisted AI</a:t>
             </a:r>
           </a:p>
         </p:txBody>
@@ -8945,7 +8945,7 @@
           <a:p>
             <a:r>
               <a:rPr lang="pt-PT" dirty="0"/>
-              <a:t>Milad Leyli-abadi, IRT SystemX</a:t>
+              <a:t>IRT SystemX</a:t>
             </a:r>
           </a:p>
         </p:txBody>
@@ -14500,7 +14500,7 @@
         <p:spPr>
           <a:xfrm>
             <a:off x="1196863" y="4529925"/>
-            <a:ext cx="10291800" cy="1200298"/>
+            <a:ext cx="10291800" cy="1538853"/>
           </a:xfrm>
           <a:prstGeom prst="rect">
             <a:avLst/>
@@ -14526,7 +14526,7 @@
               <a:buNone/>
             </a:pPr>
             <a:r>
-              <a:rPr lang="it-IT" sz="2200" dirty="0">
+              <a:rPr lang="en-US" sz="2200" noProof="0" dirty="0">
                 <a:solidFill>
                   <a:schemeClr val="dk1"/>
                 </a:solidFill>
@@ -14535,9 +14535,33 @@
                 <a:cs typeface="Calibri"/>
                 <a:sym typeface="Calibri"/>
               </a:rPr>
-              <a:t>This implementation is specific to Power Grid domain and enables the prediction of active powers from the injections in the substations (nodes of the graph). It could motivate the future implementations for decision-making in the context of RL</a:t>
-            </a:r>
-            <a:endParaRPr dirty="0">
+              <a:t>This implementation is specific to Power Grid domain and enables the prediction of active powers from the injections in the substations (nodes of the graph). It could motivate the future implementations for decision-making in the context of RL and specifically the following power grid </a:t>
+            </a:r>
+            <a:r>
+              <a:rPr lang="en-US" sz="2200" noProof="0" dirty="0" err="1">
+                <a:solidFill>
+                  <a:schemeClr val="dk1"/>
+                </a:solidFill>
+                <a:latin typeface="Calibri"/>
+                <a:ea typeface="Calibri"/>
+                <a:cs typeface="Calibri"/>
+                <a:sym typeface="Calibri"/>
+              </a:rPr>
+              <a:t>usecase</a:t>
+            </a:r>
+            <a:r>
+              <a:rPr lang="en-US" sz="2200" noProof="0" dirty="0">
+                <a:solidFill>
+                  <a:schemeClr val="dk1"/>
+                </a:solidFill>
+                <a:latin typeface="Calibri"/>
+                <a:ea typeface="Calibri"/>
+                <a:cs typeface="Calibri"/>
+                <a:sym typeface="Calibri"/>
+              </a:rPr>
+              <a:t>:  “Power Grid Assistant”</a:t>
+            </a:r>
+            <a:endParaRPr lang="en-US" noProof="0" dirty="0">
               <a:latin typeface="Calibri"/>
               <a:ea typeface="Calibri"/>
               <a:cs typeface="Calibri"/>
@@ -15660,14 +15684,14 @@
           </a:ln>
           <a:extLst>
             <a:ext uri="{909E8E84-426E-40dd-AFC4-6F175D3DCCD1}">
-              <a14:hiddenFill xmlns:a14="http://schemas.microsoft.com/office/drawing/2010/main" xmlns="">
+              <a14:hiddenFill xmlns="" xmlns:a14="http://schemas.microsoft.com/office/drawing/2010/main">
                 <a:solidFill>
                   <a:srgbClr val="FFFFFF"/>
                 </a:solidFill>
               </a14:hiddenFill>
             </a:ext>
             <a:ext uri="{91240B29-F687-4f45-9708-019B960494DF}">
-              <a14:hiddenLine xmlns:a14="http://schemas.microsoft.com/office/drawing/2010/main" xmlns="" w="9525">
+              <a14:hiddenLine xmlns="" xmlns:a14="http://schemas.microsoft.com/office/drawing/2010/main" w="9525">
                 <a:solidFill>
                   <a:srgbClr val="000000"/>
                 </a:solidFill>
@@ -15677,7 +15701,7 @@
               </a14:hiddenLine>
             </a:ext>
             <a:ext uri="{FAA26D3D-D897-4be2-8F04-BA451C77F1D7}">
-              <ma14:placeholderFlag xmlns:ma14="http://schemas.microsoft.com/office/mac/drawingml/2011/main" xmlns="" val="1"/>
+              <ma14:placeholderFlag xmlns="" xmlns:ma14="http://schemas.microsoft.com/office/mac/drawingml/2011/main" val="1"/>
             </a:ext>
           </a:extLst>
         </p:spPr>
@@ -18307,6 +18331,17 @@
 </file>
 
 <file path=customXml/item1.xml><?xml version="1.0" encoding="utf-8"?>
+<p:properties xmlns:p="http://schemas.microsoft.com/office/2006/metadata/properties" xmlns:xsi="http://www.w3.org/2001/XMLSchema-instance" xmlns:pc="http://schemas.microsoft.com/office/infopath/2007/PartnerControls">
+  <documentManagement>
+    <lcf76f155ced4ddcb4097134ff3c332f xmlns="bc89abb3-10bf-413e-ab30-26a7aef7b28c">
+      <Terms xmlns="http://schemas.microsoft.com/office/infopath/2007/PartnerControls"/>
+    </lcf76f155ced4ddcb4097134ff3c332f>
+    <TaxCatchAll xmlns="0c372da2-b3f5-4e00-83c5-35a9e92cc77b" xsi:nil="true"/>
+  </documentManagement>
+</p:properties>
+</file>
+
+<file path=customXml/item2.xml><?xml version="1.0" encoding="utf-8"?>
 <ct:contentTypeSchema xmlns:ct="http://schemas.microsoft.com/office/2006/metadata/contentType" xmlns:ma="http://schemas.microsoft.com/office/2006/metadata/properties/metaAttributes" ct:_="" ma:_="" ma:contentTypeName="Document" ma:contentTypeID="0x01010083840E53C9A57E41A850467C36B19B94" ma:contentTypeVersion="11" ma:contentTypeDescription="Crée un document." ma:contentTypeScope="" ma:versionID="d519928c97e41efbce850eec30de0ee3">
   <xsd:schema xmlns:xsd="http://www.w3.org/2001/XMLSchema" xmlns:xs="http://www.w3.org/2001/XMLSchema" xmlns:p="http://schemas.microsoft.com/office/2006/metadata/properties" xmlns:ns2="bc89abb3-10bf-413e-ab30-26a7aef7b28c" xmlns:ns3="0c372da2-b3f5-4e00-83c5-35a9e92cc77b" targetNamespace="http://schemas.microsoft.com/office/2006/metadata/properties" ma:root="true" ma:fieldsID="09caeb2112c794f4a645bbb951ad892c" ns2:_="" ns3:_="">
     <xsd:import namespace="bc89abb3-10bf-413e-ab30-26a7aef7b28c"/>
@@ -18501,17 +18536,6 @@
 </ct:contentTypeSchema>
 </file>
 
-<file path=customXml/item2.xml><?xml version="1.0" encoding="utf-8"?>
-<p:properties xmlns:p="http://schemas.microsoft.com/office/2006/metadata/properties" xmlns:xsi="http://www.w3.org/2001/XMLSchema-instance" xmlns:pc="http://schemas.microsoft.com/office/infopath/2007/PartnerControls">
-  <documentManagement>
-    <lcf76f155ced4ddcb4097134ff3c332f xmlns="bc89abb3-10bf-413e-ab30-26a7aef7b28c">
-      <Terms xmlns="http://schemas.microsoft.com/office/infopath/2007/PartnerControls"/>
-    </lcf76f155ced4ddcb4097134ff3c332f>
-    <TaxCatchAll xmlns="0c372da2-b3f5-4e00-83c5-35a9e92cc77b" xsi:nil="true"/>
-  </documentManagement>
-</p:properties>
-</file>
-
 <file path=customXml/item3.xml><?xml version="1.0" encoding="utf-8"?>
 <?mso-contentType ?>
 <FormTemplates xmlns="http://schemas.microsoft.com/sharepoint/v3/contenttype/forms">
@@ -18522,6 +18546,17 @@
 </file>
 
 <file path=customXml/itemProps1.xml><?xml version="1.0" encoding="utf-8"?>
+<ds:datastoreItem xmlns:ds="http://schemas.openxmlformats.org/officeDocument/2006/customXml" ds:itemID="{DECA5E07-CAB8-4690-A0EF-32A0CE10E7BD}">
+  <ds:schemaRefs>
+    <ds:schemaRef ds:uri="http://schemas.microsoft.com/office/2006/metadata/properties"/>
+    <ds:schemaRef ds:uri="http://schemas.microsoft.com/office/infopath/2007/PartnerControls"/>
+    <ds:schemaRef ds:uri="bc89abb3-10bf-413e-ab30-26a7aef7b28c"/>
+    <ds:schemaRef ds:uri="0c372da2-b3f5-4e00-83c5-35a9e92cc77b"/>
+  </ds:schemaRefs>
+</ds:datastoreItem>
+</file>
+
+<file path=customXml/itemProps2.xml><?xml version="1.0" encoding="utf-8"?>
 <ds:datastoreItem xmlns:ds="http://schemas.openxmlformats.org/officeDocument/2006/customXml" ds:itemID="{1913D7BC-CDA6-4C79-B1AB-B9D59D7CBCEB}">
   <ds:schemaRefs>
     <ds:schemaRef ds:uri="http://schemas.microsoft.com/office/2006/metadata/contentType"/>
@@ -18540,17 +18575,6 @@
 </ds:datastoreItem>
 </file>
 
-<file path=customXml/itemProps2.xml><?xml version="1.0" encoding="utf-8"?>
-<ds:datastoreItem xmlns:ds="http://schemas.openxmlformats.org/officeDocument/2006/customXml" ds:itemID="{DECA5E07-CAB8-4690-A0EF-32A0CE10E7BD}">
-  <ds:schemaRefs>
-    <ds:schemaRef ds:uri="http://schemas.microsoft.com/office/2006/metadata/properties"/>
-    <ds:schemaRef ds:uri="http://schemas.microsoft.com/office/infopath/2007/PartnerControls"/>
-    <ds:schemaRef ds:uri="bc89abb3-10bf-413e-ab30-26a7aef7b28c"/>
-    <ds:schemaRef ds:uri="0c372da2-b3f5-4e00-83c5-35a9e92cc77b"/>
-  </ds:schemaRefs>
-</ds:datastoreItem>
-</file>
-
 <file path=customXml/itemProps3.xml><?xml version="1.0" encoding="utf-8"?>
 <ds:datastoreItem xmlns:ds="http://schemas.openxmlformats.org/officeDocument/2006/customXml" ds:itemID="{4BB3FBEB-0F82-46CF-9392-31DFF6E207EB}">
   <ds:schemaRefs>

</xml_diff>